<commit_message>
Probably finished with efc tutorial
</commit_message>
<xml_diff>
--- a/Tutorials/TodoTutorialPart1_Blazor/Resources/Presentation1.pptx
+++ b/Tutorials/TodoTutorialPart1_Blazor/Resources/Presentation1.pptx
@@ -7,6 +7,7 @@
   <p:sldIdLst>
     <p:sldId id="256" r:id="rId2"/>
     <p:sldId id="257" r:id="rId3"/>
+    <p:sldId id="258" r:id="rId4"/>
   </p:sldIdLst>
   <p:sldSz cx="12192000" cy="6858000"/>
   <p:notesSz cx="6858000" cy="9144000"/>
@@ -105,6 +106,11 @@
       </a:defRPr>
     </a:lvl9pPr>
   </p:defaultTextStyle>
+  <p:extLst>
+    <p:ext uri="{EFAFB233-063F-42B5-8137-9DF3F51BA10A}">
+      <p15:sldGuideLst xmlns:p15="http://schemas.microsoft.com/office/powerpoint/2012/main"/>
+    </p:ext>
+  </p:extLst>
 </p:presentation>
 </file>
 
@@ -257,7 +263,7 @@
           <a:p>
             <a:fld id="{51BD5D96-1797-402C-A91B-B395CAFE6E68}" type="datetimeFigureOut">
               <a:rPr lang="da-DK" smtClean="0"/>
-              <a:t>03-12-2021</a:t>
+              <a:t>08-04-2022</a:t>
             </a:fld>
             <a:endParaRPr lang="da-DK"/>
           </a:p>
@@ -311,7 +317,7 @@
           <a:p>
             <a:fld id="{57374383-B0B1-407F-8DDC-4B97F4B49F2D}" type="slidenum">
               <a:rPr lang="da-DK" smtClean="0"/>
-              <a:t>‹#›</a:t>
+              <a:t>‹nr.›</a:t>
             </a:fld>
             <a:endParaRPr lang="da-DK"/>
           </a:p>
@@ -457,7 +463,7 @@
           <a:p>
             <a:fld id="{51BD5D96-1797-402C-A91B-B395CAFE6E68}" type="datetimeFigureOut">
               <a:rPr lang="da-DK" smtClean="0"/>
-              <a:t>03-12-2021</a:t>
+              <a:t>08-04-2022</a:t>
             </a:fld>
             <a:endParaRPr lang="da-DK"/>
           </a:p>
@@ -511,7 +517,7 @@
           <a:p>
             <a:fld id="{57374383-B0B1-407F-8DDC-4B97F4B49F2D}" type="slidenum">
               <a:rPr lang="da-DK" smtClean="0"/>
-              <a:t>‹#›</a:t>
+              <a:t>‹nr.›</a:t>
             </a:fld>
             <a:endParaRPr lang="da-DK"/>
           </a:p>
@@ -667,7 +673,7 @@
           <a:p>
             <a:fld id="{51BD5D96-1797-402C-A91B-B395CAFE6E68}" type="datetimeFigureOut">
               <a:rPr lang="da-DK" smtClean="0"/>
-              <a:t>03-12-2021</a:t>
+              <a:t>08-04-2022</a:t>
             </a:fld>
             <a:endParaRPr lang="da-DK"/>
           </a:p>
@@ -721,7 +727,7 @@
           <a:p>
             <a:fld id="{57374383-B0B1-407F-8DDC-4B97F4B49F2D}" type="slidenum">
               <a:rPr lang="da-DK" smtClean="0"/>
-              <a:t>‹#›</a:t>
+              <a:t>‹nr.›</a:t>
             </a:fld>
             <a:endParaRPr lang="da-DK"/>
           </a:p>
@@ -867,7 +873,7 @@
           <a:p>
             <a:fld id="{51BD5D96-1797-402C-A91B-B395CAFE6E68}" type="datetimeFigureOut">
               <a:rPr lang="da-DK" smtClean="0"/>
-              <a:t>03-12-2021</a:t>
+              <a:t>08-04-2022</a:t>
             </a:fld>
             <a:endParaRPr lang="da-DK"/>
           </a:p>
@@ -921,7 +927,7 @@
           <a:p>
             <a:fld id="{57374383-B0B1-407F-8DDC-4B97F4B49F2D}" type="slidenum">
               <a:rPr lang="da-DK" smtClean="0"/>
-              <a:t>‹#›</a:t>
+              <a:t>‹nr.›</a:t>
             </a:fld>
             <a:endParaRPr lang="da-DK"/>
           </a:p>
@@ -1143,7 +1149,7 @@
           <a:p>
             <a:fld id="{51BD5D96-1797-402C-A91B-B395CAFE6E68}" type="datetimeFigureOut">
               <a:rPr lang="da-DK" smtClean="0"/>
-              <a:t>03-12-2021</a:t>
+              <a:t>08-04-2022</a:t>
             </a:fld>
             <a:endParaRPr lang="da-DK"/>
           </a:p>
@@ -1197,7 +1203,7 @@
           <a:p>
             <a:fld id="{57374383-B0B1-407F-8DDC-4B97F4B49F2D}" type="slidenum">
               <a:rPr lang="da-DK" smtClean="0"/>
-              <a:t>‹#›</a:t>
+              <a:t>‹nr.›</a:t>
             </a:fld>
             <a:endParaRPr lang="da-DK"/>
           </a:p>
@@ -1411,7 +1417,7 @@
           <a:p>
             <a:fld id="{51BD5D96-1797-402C-A91B-B395CAFE6E68}" type="datetimeFigureOut">
               <a:rPr lang="da-DK" smtClean="0"/>
-              <a:t>03-12-2021</a:t>
+              <a:t>08-04-2022</a:t>
             </a:fld>
             <a:endParaRPr lang="da-DK"/>
           </a:p>
@@ -1465,7 +1471,7 @@
           <a:p>
             <a:fld id="{57374383-B0B1-407F-8DDC-4B97F4B49F2D}" type="slidenum">
               <a:rPr lang="da-DK" smtClean="0"/>
-              <a:t>‹#›</a:t>
+              <a:t>‹nr.›</a:t>
             </a:fld>
             <a:endParaRPr lang="da-DK"/>
           </a:p>
@@ -1826,7 +1832,7 @@
           <a:p>
             <a:fld id="{51BD5D96-1797-402C-A91B-B395CAFE6E68}" type="datetimeFigureOut">
               <a:rPr lang="da-DK" smtClean="0"/>
-              <a:t>03-12-2021</a:t>
+              <a:t>08-04-2022</a:t>
             </a:fld>
             <a:endParaRPr lang="da-DK"/>
           </a:p>
@@ -1880,7 +1886,7 @@
           <a:p>
             <a:fld id="{57374383-B0B1-407F-8DDC-4B97F4B49F2D}" type="slidenum">
               <a:rPr lang="da-DK" smtClean="0"/>
-              <a:t>‹#›</a:t>
+              <a:t>‹nr.›</a:t>
             </a:fld>
             <a:endParaRPr lang="da-DK"/>
           </a:p>
@@ -1968,7 +1974,7 @@
           <a:p>
             <a:fld id="{51BD5D96-1797-402C-A91B-B395CAFE6E68}" type="datetimeFigureOut">
               <a:rPr lang="da-DK" smtClean="0"/>
-              <a:t>03-12-2021</a:t>
+              <a:t>08-04-2022</a:t>
             </a:fld>
             <a:endParaRPr lang="da-DK"/>
           </a:p>
@@ -2022,7 +2028,7 @@
           <a:p>
             <a:fld id="{57374383-B0B1-407F-8DDC-4B97F4B49F2D}" type="slidenum">
               <a:rPr lang="da-DK" smtClean="0"/>
-              <a:t>‹#›</a:t>
+              <a:t>‹nr.›</a:t>
             </a:fld>
             <a:endParaRPr lang="da-DK"/>
           </a:p>
@@ -2081,7 +2087,7 @@
           <a:p>
             <a:fld id="{51BD5D96-1797-402C-A91B-B395CAFE6E68}" type="datetimeFigureOut">
               <a:rPr lang="da-DK" smtClean="0"/>
-              <a:t>03-12-2021</a:t>
+              <a:t>08-04-2022</a:t>
             </a:fld>
             <a:endParaRPr lang="da-DK"/>
           </a:p>
@@ -2135,7 +2141,7 @@
           <a:p>
             <a:fld id="{57374383-B0B1-407F-8DDC-4B97F4B49F2D}" type="slidenum">
               <a:rPr lang="da-DK" smtClean="0"/>
-              <a:t>‹#›</a:t>
+              <a:t>‹nr.›</a:t>
             </a:fld>
             <a:endParaRPr lang="da-DK"/>
           </a:p>
@@ -2394,7 +2400,7 @@
           <a:p>
             <a:fld id="{51BD5D96-1797-402C-A91B-B395CAFE6E68}" type="datetimeFigureOut">
               <a:rPr lang="da-DK" smtClean="0"/>
-              <a:t>03-12-2021</a:t>
+              <a:t>08-04-2022</a:t>
             </a:fld>
             <a:endParaRPr lang="da-DK"/>
           </a:p>
@@ -2448,7 +2454,7 @@
           <a:p>
             <a:fld id="{57374383-B0B1-407F-8DDC-4B97F4B49F2D}" type="slidenum">
               <a:rPr lang="da-DK" smtClean="0"/>
-              <a:t>‹#›</a:t>
+              <a:t>‹nr.›</a:t>
             </a:fld>
             <a:endParaRPr lang="da-DK"/>
           </a:p>
@@ -2683,7 +2689,7 @@
           <a:p>
             <a:fld id="{51BD5D96-1797-402C-A91B-B395CAFE6E68}" type="datetimeFigureOut">
               <a:rPr lang="da-DK" smtClean="0"/>
-              <a:t>03-12-2021</a:t>
+              <a:t>08-04-2022</a:t>
             </a:fld>
             <a:endParaRPr lang="da-DK"/>
           </a:p>
@@ -2737,7 +2743,7 @@
           <a:p>
             <a:fld id="{57374383-B0B1-407F-8DDC-4B97F4B49F2D}" type="slidenum">
               <a:rPr lang="da-DK" smtClean="0"/>
-              <a:t>‹#›</a:t>
+              <a:t>‹nr.›</a:t>
             </a:fld>
             <a:endParaRPr lang="da-DK"/>
           </a:p>
@@ -2926,7 +2932,7 @@
           <a:p>
             <a:fld id="{51BD5D96-1797-402C-A91B-B395CAFE6E68}" type="datetimeFigureOut">
               <a:rPr lang="da-DK" smtClean="0"/>
-              <a:t>03-12-2021</a:t>
+              <a:t>08-04-2022</a:t>
             </a:fld>
             <a:endParaRPr lang="da-DK"/>
           </a:p>
@@ -3016,7 +3022,7 @@
           <a:p>
             <a:fld id="{57374383-B0B1-407F-8DDC-4B97F4B49F2D}" type="slidenum">
               <a:rPr lang="da-DK" smtClean="0"/>
-              <a:t>‹#›</a:t>
+              <a:t>‹nr.›</a:t>
             </a:fld>
             <a:endParaRPr lang="da-DK"/>
           </a:p>
@@ -5004,6 +5010,1549 @@
 </p:sld>
 </file>
 
+<file path=ppt/slides/slide3.xml><?xml version="1.0" encoding="utf-8"?>
+<p:sld xmlns:a="http://schemas.openxmlformats.org/drawingml/2006/main" xmlns:r="http://schemas.openxmlformats.org/officeDocument/2006/relationships" xmlns:p="http://schemas.openxmlformats.org/presentationml/2006/main">
+  <p:cSld>
+    <p:spTree>
+      <p:nvGrpSpPr>
+        <p:cNvPr id="1" name=""/>
+        <p:cNvGrpSpPr/>
+        <p:nvPr/>
+      </p:nvGrpSpPr>
+      <p:grpSpPr>
+        <a:xfrm>
+          <a:off x="0" y="0"/>
+          <a:ext cx="0" cy="0"/>
+          <a:chOff x="0" y="0"/>
+          <a:chExt cx="0" cy="0"/>
+        </a:xfrm>
+      </p:grpSpPr>
+      <p:sp>
+        <p:nvSpPr>
+          <p:cNvPr id="28" name="Rutediagram: Proces 27">
+            <a:extLst>
+              <a:ext uri="{FF2B5EF4-FFF2-40B4-BE49-F238E27FC236}">
+                <a16:creationId xmlns:a16="http://schemas.microsoft.com/office/drawing/2014/main" id="{9E903C6A-FEA0-4E88-AE31-919173AE6873}"/>
+              </a:ext>
+            </a:extLst>
+          </p:cNvPr>
+          <p:cNvSpPr/>
+          <p:nvPr/>
+        </p:nvSpPr>
+        <p:spPr>
+          <a:xfrm>
+            <a:off x="2737520" y="3901819"/>
+            <a:ext cx="5304656" cy="1760797"/>
+          </a:xfrm>
+          <a:prstGeom prst="flowChartProcess">
+            <a:avLst/>
+          </a:prstGeom>
+          <a:solidFill>
+            <a:srgbClr val="E2F0D9">
+              <a:alpha val="38824"/>
+            </a:srgbClr>
+          </a:solidFill>
+        </p:spPr>
+        <p:style>
+          <a:lnRef idx="2">
+            <a:schemeClr val="accent1">
+              <a:shade val="50000"/>
+            </a:schemeClr>
+          </a:lnRef>
+          <a:fillRef idx="1">
+            <a:schemeClr val="accent1"/>
+          </a:fillRef>
+          <a:effectRef idx="0">
+            <a:schemeClr val="accent1"/>
+          </a:effectRef>
+          <a:fontRef idx="minor">
+            <a:schemeClr val="lt1"/>
+          </a:fontRef>
+        </p:style>
+        <p:txBody>
+          <a:bodyPr rtlCol="0" anchor="ctr"/>
+          <a:lstStyle/>
+          <a:p>
+            <a:pPr algn="ctr"/>
+            <a:endParaRPr lang="da-DK"/>
+          </a:p>
+        </p:txBody>
+      </p:sp>
+      <p:sp>
+        <p:nvSpPr>
+          <p:cNvPr id="4" name="Rektangel: afrundede hjørner 3">
+            <a:extLst>
+              <a:ext uri="{FF2B5EF4-FFF2-40B4-BE49-F238E27FC236}">
+                <a16:creationId xmlns:a16="http://schemas.microsoft.com/office/drawing/2014/main" id="{2B0594E2-EF50-423E-AEB9-B31913228B2A}"/>
+              </a:ext>
+            </a:extLst>
+          </p:cNvPr>
+          <p:cNvSpPr/>
+          <p:nvPr/>
+        </p:nvSpPr>
+        <p:spPr>
+          <a:xfrm>
+            <a:off x="2871724" y="825591"/>
+            <a:ext cx="2292724" cy="705970"/>
+          </a:xfrm>
+          <a:prstGeom prst="roundRect">
+            <a:avLst/>
+          </a:prstGeom>
+          <a:solidFill>
+            <a:schemeClr val="accent6">
+              <a:lumMod val="40000"/>
+              <a:lumOff val="60000"/>
+            </a:schemeClr>
+          </a:solidFill>
+          <a:ln>
+            <a:noFill/>
+          </a:ln>
+        </p:spPr>
+        <p:style>
+          <a:lnRef idx="2">
+            <a:schemeClr val="accent1">
+              <a:shade val="50000"/>
+            </a:schemeClr>
+          </a:lnRef>
+          <a:fillRef idx="1">
+            <a:schemeClr val="accent1"/>
+          </a:fillRef>
+          <a:effectRef idx="0">
+            <a:schemeClr val="accent1"/>
+          </a:effectRef>
+          <a:fontRef idx="minor">
+            <a:schemeClr val="lt1"/>
+          </a:fontRef>
+        </p:style>
+        <p:txBody>
+          <a:bodyPr rtlCol="0" anchor="ctr"/>
+          <a:lstStyle/>
+          <a:p>
+            <a:pPr algn="ctr"/>
+            <a:r>
+              <a:rPr lang="da-DK" dirty="0"/>
+              <a:t>Pages</a:t>
+            </a:r>
+          </a:p>
+          <a:p>
+            <a:pPr algn="ctr"/>
+            <a:endParaRPr lang="da-DK" dirty="0"/>
+          </a:p>
+        </p:txBody>
+      </p:sp>
+      <p:sp>
+        <p:nvSpPr>
+          <p:cNvPr id="5" name="Rektangel: afrundede hjørner 4">
+            <a:extLst>
+              <a:ext uri="{FF2B5EF4-FFF2-40B4-BE49-F238E27FC236}">
+                <a16:creationId xmlns:a16="http://schemas.microsoft.com/office/drawing/2014/main" id="{DBE26E45-EA59-4983-ADDD-61DD9850C558}"/>
+              </a:ext>
+            </a:extLst>
+          </p:cNvPr>
+          <p:cNvSpPr/>
+          <p:nvPr/>
+        </p:nvSpPr>
+        <p:spPr>
+          <a:xfrm>
+            <a:off x="2972577" y="1195384"/>
+            <a:ext cx="2091018" cy="262220"/>
+          </a:xfrm>
+          <a:prstGeom prst="roundRect">
+            <a:avLst/>
+          </a:prstGeom>
+          <a:solidFill>
+            <a:schemeClr val="accent6">
+              <a:lumMod val="75000"/>
+            </a:schemeClr>
+          </a:solidFill>
+          <a:ln>
+            <a:noFill/>
+          </a:ln>
+        </p:spPr>
+        <p:style>
+          <a:lnRef idx="2">
+            <a:schemeClr val="accent1">
+              <a:shade val="50000"/>
+            </a:schemeClr>
+          </a:lnRef>
+          <a:fillRef idx="1">
+            <a:schemeClr val="accent1"/>
+          </a:fillRef>
+          <a:effectRef idx="0">
+            <a:schemeClr val="accent1"/>
+          </a:effectRef>
+          <a:fontRef idx="minor">
+            <a:schemeClr val="lt1"/>
+          </a:fontRef>
+        </p:style>
+        <p:txBody>
+          <a:bodyPr rtlCol="0" anchor="ctr"/>
+          <a:lstStyle/>
+          <a:p>
+            <a:pPr algn="ctr"/>
+            <a:r>
+              <a:rPr lang="da-DK" dirty="0"/>
+              <a:t>Code </a:t>
+            </a:r>
+            <a:r>
+              <a:rPr lang="da-DK" dirty="0" err="1"/>
+              <a:t>blocks</a:t>
+            </a:r>
+            <a:endParaRPr lang="da-DK" dirty="0"/>
+          </a:p>
+        </p:txBody>
+      </p:sp>
+      <p:sp>
+        <p:nvSpPr>
+          <p:cNvPr id="6" name="Rektangel: afrundede hjørner 5">
+            <a:extLst>
+              <a:ext uri="{FF2B5EF4-FFF2-40B4-BE49-F238E27FC236}">
+                <a16:creationId xmlns:a16="http://schemas.microsoft.com/office/drawing/2014/main" id="{B3673C69-37A5-4FAC-BBB0-DF5D3AD492A6}"/>
+              </a:ext>
+            </a:extLst>
+          </p:cNvPr>
+          <p:cNvSpPr/>
+          <p:nvPr/>
+        </p:nvSpPr>
+        <p:spPr>
+          <a:xfrm>
+            <a:off x="2871724" y="1571905"/>
+            <a:ext cx="2292724" cy="188256"/>
+          </a:xfrm>
+          <a:prstGeom prst="roundRect">
+            <a:avLst/>
+          </a:prstGeom>
+          <a:solidFill>
+            <a:schemeClr val="bg1">
+              <a:lumMod val="85000"/>
+            </a:schemeClr>
+          </a:solidFill>
+          <a:ln>
+            <a:noFill/>
+          </a:ln>
+        </p:spPr>
+        <p:style>
+          <a:lnRef idx="2">
+            <a:schemeClr val="accent1">
+              <a:shade val="50000"/>
+            </a:schemeClr>
+          </a:lnRef>
+          <a:fillRef idx="1">
+            <a:schemeClr val="accent1"/>
+          </a:fillRef>
+          <a:effectRef idx="0">
+            <a:schemeClr val="accent1"/>
+          </a:effectRef>
+          <a:fontRef idx="minor">
+            <a:schemeClr val="lt1"/>
+          </a:fontRef>
+        </p:style>
+        <p:txBody>
+          <a:bodyPr rtlCol="0" anchor="ctr"/>
+          <a:lstStyle/>
+          <a:p>
+            <a:pPr algn="ctr"/>
+            <a:r>
+              <a:rPr lang="da-DK" dirty="0">
+                <a:solidFill>
+                  <a:schemeClr val="tx1"/>
+                </a:solidFill>
+              </a:rPr>
+              <a:t>&lt;&lt;</a:t>
+            </a:r>
+            <a:r>
+              <a:rPr lang="da-DK" dirty="0" err="1">
+                <a:solidFill>
+                  <a:schemeClr val="tx1"/>
+                </a:solidFill>
+              </a:rPr>
+              <a:t>IService</a:t>
+            </a:r>
+            <a:r>
+              <a:rPr lang="da-DK" dirty="0">
+                <a:solidFill>
+                  <a:schemeClr val="tx1"/>
+                </a:solidFill>
+              </a:rPr>
+              <a:t>&gt;&gt;</a:t>
+            </a:r>
+          </a:p>
+        </p:txBody>
+      </p:sp>
+      <p:sp>
+        <p:nvSpPr>
+          <p:cNvPr id="7" name="Rektangel: afrundede hjørner 6">
+            <a:extLst>
+              <a:ext uri="{FF2B5EF4-FFF2-40B4-BE49-F238E27FC236}">
+                <a16:creationId xmlns:a16="http://schemas.microsoft.com/office/drawing/2014/main" id="{1DADBAE0-DB75-4162-A05E-D3FD8428C4BD}"/>
+              </a:ext>
+            </a:extLst>
+          </p:cNvPr>
+          <p:cNvSpPr/>
+          <p:nvPr/>
+        </p:nvSpPr>
+        <p:spPr>
+          <a:xfrm>
+            <a:off x="2871724" y="3283038"/>
+            <a:ext cx="2292724" cy="336175"/>
+          </a:xfrm>
+          <a:prstGeom prst="roundRect">
+            <a:avLst/>
+          </a:prstGeom>
+          <a:solidFill>
+            <a:schemeClr val="accent5">
+              <a:lumMod val="40000"/>
+              <a:lumOff val="60000"/>
+            </a:schemeClr>
+          </a:solidFill>
+          <a:ln>
+            <a:noFill/>
+          </a:ln>
+        </p:spPr>
+        <p:style>
+          <a:lnRef idx="2">
+            <a:schemeClr val="accent1">
+              <a:shade val="50000"/>
+            </a:schemeClr>
+          </a:lnRef>
+          <a:fillRef idx="1">
+            <a:schemeClr val="accent1"/>
+          </a:fillRef>
+          <a:effectRef idx="0">
+            <a:schemeClr val="accent1"/>
+          </a:effectRef>
+          <a:fontRef idx="minor">
+            <a:schemeClr val="lt1"/>
+          </a:fontRef>
+        </p:style>
+        <p:txBody>
+          <a:bodyPr rtlCol="0" anchor="ctr"/>
+          <a:lstStyle/>
+          <a:p>
+            <a:pPr algn="ctr"/>
+            <a:r>
+              <a:rPr lang="da-DK" dirty="0"/>
+              <a:t>Services (</a:t>
+            </a:r>
+            <a:r>
+              <a:rPr lang="da-DK" dirty="0" err="1"/>
+              <a:t>logic</a:t>
+            </a:r>
+            <a:r>
+              <a:rPr lang="da-DK" dirty="0"/>
+              <a:t>)</a:t>
+            </a:r>
+          </a:p>
+        </p:txBody>
+      </p:sp>
+      <p:sp>
+        <p:nvSpPr>
+          <p:cNvPr id="8" name="Rektangel: afrundede hjørner 7">
+            <a:extLst>
+              <a:ext uri="{FF2B5EF4-FFF2-40B4-BE49-F238E27FC236}">
+                <a16:creationId xmlns:a16="http://schemas.microsoft.com/office/drawing/2014/main" id="{5577FBCE-B11A-4C56-A389-D952EBFD34E3}"/>
+              </a:ext>
+            </a:extLst>
+          </p:cNvPr>
+          <p:cNvSpPr/>
+          <p:nvPr/>
+        </p:nvSpPr>
+        <p:spPr>
+          <a:xfrm>
+            <a:off x="2871724" y="3686449"/>
+            <a:ext cx="2292724" cy="188256"/>
+          </a:xfrm>
+          <a:prstGeom prst="roundRect">
+            <a:avLst/>
+          </a:prstGeom>
+          <a:solidFill>
+            <a:schemeClr val="bg1">
+              <a:lumMod val="85000"/>
+            </a:schemeClr>
+          </a:solidFill>
+          <a:ln>
+            <a:noFill/>
+          </a:ln>
+        </p:spPr>
+        <p:style>
+          <a:lnRef idx="2">
+            <a:schemeClr val="accent1">
+              <a:shade val="50000"/>
+            </a:schemeClr>
+          </a:lnRef>
+          <a:fillRef idx="1">
+            <a:schemeClr val="accent1"/>
+          </a:fillRef>
+          <a:effectRef idx="0">
+            <a:schemeClr val="accent1"/>
+          </a:effectRef>
+          <a:fontRef idx="minor">
+            <a:schemeClr val="lt1"/>
+          </a:fontRef>
+        </p:style>
+        <p:txBody>
+          <a:bodyPr rtlCol="0" anchor="ctr"/>
+          <a:lstStyle/>
+          <a:p>
+            <a:pPr algn="ctr"/>
+            <a:r>
+              <a:rPr lang="da-DK" dirty="0">
+                <a:solidFill>
+                  <a:schemeClr val="tx1"/>
+                </a:solidFill>
+              </a:rPr>
+              <a:t>&lt;&lt;IDAO&gt;&gt;</a:t>
+            </a:r>
+          </a:p>
+        </p:txBody>
+      </p:sp>
+      <p:sp>
+        <p:nvSpPr>
+          <p:cNvPr id="9" name="Rektangel: afrundede hjørner 8">
+            <a:extLst>
+              <a:ext uri="{FF2B5EF4-FFF2-40B4-BE49-F238E27FC236}">
+                <a16:creationId xmlns:a16="http://schemas.microsoft.com/office/drawing/2014/main" id="{9D059441-C939-4C5A-B60F-11BB83E131A9}"/>
+              </a:ext>
+            </a:extLst>
+          </p:cNvPr>
+          <p:cNvSpPr/>
+          <p:nvPr/>
+        </p:nvSpPr>
+        <p:spPr>
+          <a:xfrm>
+            <a:off x="2871724" y="3941941"/>
+            <a:ext cx="2292724" cy="336175"/>
+          </a:xfrm>
+          <a:prstGeom prst="roundRect">
+            <a:avLst/>
+          </a:prstGeom>
+          <a:solidFill>
+            <a:schemeClr val="accent2">
+              <a:lumMod val="60000"/>
+              <a:lumOff val="40000"/>
+            </a:schemeClr>
+          </a:solidFill>
+          <a:ln>
+            <a:noFill/>
+          </a:ln>
+        </p:spPr>
+        <p:style>
+          <a:lnRef idx="2">
+            <a:schemeClr val="accent1">
+              <a:shade val="50000"/>
+            </a:schemeClr>
+          </a:lnRef>
+          <a:fillRef idx="1">
+            <a:schemeClr val="accent1"/>
+          </a:fillRef>
+          <a:effectRef idx="0">
+            <a:schemeClr val="accent1"/>
+          </a:effectRef>
+          <a:fontRef idx="minor">
+            <a:schemeClr val="lt1"/>
+          </a:fontRef>
+        </p:style>
+        <p:txBody>
+          <a:bodyPr rtlCol="0" anchor="ctr"/>
+          <a:lstStyle/>
+          <a:p>
+            <a:pPr algn="ctr"/>
+            <a:r>
+              <a:rPr lang="da-DK" dirty="0" err="1"/>
+              <a:t>DAOs</a:t>
+            </a:r>
+            <a:endParaRPr lang="da-DK" dirty="0"/>
+          </a:p>
+        </p:txBody>
+      </p:sp>
+      <p:sp>
+        <p:nvSpPr>
+          <p:cNvPr id="10" name="Rektangel: afrundede hjørner 9">
+            <a:extLst>
+              <a:ext uri="{FF2B5EF4-FFF2-40B4-BE49-F238E27FC236}">
+                <a16:creationId xmlns:a16="http://schemas.microsoft.com/office/drawing/2014/main" id="{5D226A38-7832-411D-B8F7-0EF05BCC2A22}"/>
+              </a:ext>
+            </a:extLst>
+          </p:cNvPr>
+          <p:cNvSpPr/>
+          <p:nvPr/>
+        </p:nvSpPr>
+        <p:spPr>
+          <a:xfrm>
+            <a:off x="3322201" y="4405866"/>
+            <a:ext cx="1391770" cy="336175"/>
+          </a:xfrm>
+          <a:prstGeom prst="roundRect">
+            <a:avLst/>
+          </a:prstGeom>
+          <a:solidFill>
+            <a:srgbClr val="F1BBD6"/>
+          </a:solidFill>
+          <a:ln>
+            <a:noFill/>
+          </a:ln>
+        </p:spPr>
+        <p:style>
+          <a:lnRef idx="2">
+            <a:schemeClr val="accent1">
+              <a:shade val="50000"/>
+            </a:schemeClr>
+          </a:lnRef>
+          <a:fillRef idx="1">
+            <a:schemeClr val="accent1"/>
+          </a:fillRef>
+          <a:effectRef idx="0">
+            <a:schemeClr val="accent1"/>
+          </a:effectRef>
+          <a:fontRef idx="minor">
+            <a:schemeClr val="lt1"/>
+          </a:fontRef>
+        </p:style>
+        <p:txBody>
+          <a:bodyPr rtlCol="0" anchor="ctr"/>
+          <a:lstStyle/>
+          <a:p>
+            <a:pPr algn="ctr"/>
+            <a:r>
+              <a:rPr lang="da-DK" dirty="0" err="1"/>
+              <a:t>Context</a:t>
+            </a:r>
+            <a:endParaRPr lang="da-DK" dirty="0"/>
+          </a:p>
+        </p:txBody>
+      </p:sp>
+      <p:pic>
+        <p:nvPicPr>
+          <p:cNvPr id="11" name="Picture 2" descr="Free File Icon, Symbol. PNG, SVG Download.">
+            <a:extLst>
+              <a:ext uri="{FF2B5EF4-FFF2-40B4-BE49-F238E27FC236}">
+                <a16:creationId xmlns:a16="http://schemas.microsoft.com/office/drawing/2014/main" id="{FFFAEB56-AB07-4583-8AB9-51BD95543DDB}"/>
+              </a:ext>
+            </a:extLst>
+          </p:cNvPr>
+          <p:cNvPicPr>
+            <a:picLocks noChangeAspect="1" noChangeArrowheads="1"/>
+          </p:cNvPicPr>
+          <p:nvPr/>
+        </p:nvPicPr>
+        <p:blipFill>
+          <a:blip r:embed="rId2">
+            <a:extLst>
+              <a:ext uri="{28A0092B-C50C-407E-A947-70E740481C1C}">
+                <a14:useLocalDpi xmlns:a14="http://schemas.microsoft.com/office/drawing/2010/main" val="0"/>
+              </a:ext>
+            </a:extLst>
+          </a:blip>
+          <a:srcRect/>
+          <a:stretch>
+            <a:fillRect/>
+          </a:stretch>
+        </p:blipFill>
+        <p:spPr bwMode="auto">
+          <a:xfrm>
+            <a:off x="3651653" y="4869791"/>
+            <a:ext cx="732865" cy="732865"/>
+          </a:xfrm>
+          <a:prstGeom prst="rect">
+            <a:avLst/>
+          </a:prstGeom>
+          <a:noFill/>
+          <a:extLst>
+            <a:ext uri="{909E8E84-426E-40DD-AFC4-6F175D3DCCD1}">
+              <a14:hiddenFill xmlns:a14="http://schemas.microsoft.com/office/drawing/2010/main">
+                <a:solidFill>
+                  <a:srgbClr val="FFFFFF"/>
+                </a:solidFill>
+              </a14:hiddenFill>
+            </a:ext>
+          </a:extLst>
+        </p:spPr>
+      </p:pic>
+      <p:sp>
+        <p:nvSpPr>
+          <p:cNvPr id="12" name="Rektangel: afrundede hjørner 11">
+            <a:extLst>
+              <a:ext uri="{FF2B5EF4-FFF2-40B4-BE49-F238E27FC236}">
+                <a16:creationId xmlns:a16="http://schemas.microsoft.com/office/drawing/2014/main" id="{A738139E-4CC9-4465-9F99-519574D0A5B3}"/>
+              </a:ext>
+            </a:extLst>
+          </p:cNvPr>
+          <p:cNvSpPr/>
+          <p:nvPr/>
+        </p:nvSpPr>
+        <p:spPr>
+          <a:xfrm>
+            <a:off x="2871724" y="2980481"/>
+            <a:ext cx="2292724" cy="188256"/>
+          </a:xfrm>
+          <a:prstGeom prst="roundRect">
+            <a:avLst/>
+          </a:prstGeom>
+          <a:solidFill>
+            <a:schemeClr val="bg1">
+              <a:lumMod val="85000"/>
+            </a:schemeClr>
+          </a:solidFill>
+          <a:ln>
+            <a:noFill/>
+          </a:ln>
+        </p:spPr>
+        <p:style>
+          <a:lnRef idx="2">
+            <a:schemeClr val="accent1">
+              <a:shade val="50000"/>
+            </a:schemeClr>
+          </a:lnRef>
+          <a:fillRef idx="1">
+            <a:schemeClr val="accent1"/>
+          </a:fillRef>
+          <a:effectRef idx="0">
+            <a:schemeClr val="accent1"/>
+          </a:effectRef>
+          <a:fontRef idx="minor">
+            <a:schemeClr val="lt1"/>
+          </a:fontRef>
+        </p:style>
+        <p:txBody>
+          <a:bodyPr rtlCol="0" anchor="ctr"/>
+          <a:lstStyle/>
+          <a:p>
+            <a:pPr algn="ctr"/>
+            <a:r>
+              <a:rPr lang="da-DK" dirty="0">
+                <a:solidFill>
+                  <a:schemeClr val="tx1"/>
+                </a:solidFill>
+              </a:rPr>
+              <a:t>&lt;&lt;</a:t>
+            </a:r>
+            <a:r>
+              <a:rPr lang="da-DK" dirty="0" err="1">
+                <a:solidFill>
+                  <a:schemeClr val="tx1"/>
+                </a:solidFill>
+              </a:rPr>
+              <a:t>IService</a:t>
+            </a:r>
+            <a:r>
+              <a:rPr lang="da-DK" dirty="0">
+                <a:solidFill>
+                  <a:schemeClr val="tx1"/>
+                </a:solidFill>
+              </a:rPr>
+              <a:t>&gt;&gt;</a:t>
+            </a:r>
+          </a:p>
+        </p:txBody>
+      </p:sp>
+      <p:sp>
+        <p:nvSpPr>
+          <p:cNvPr id="13" name="Rektangel: afrundede hjørner 12">
+            <a:extLst>
+              <a:ext uri="{FF2B5EF4-FFF2-40B4-BE49-F238E27FC236}">
+                <a16:creationId xmlns:a16="http://schemas.microsoft.com/office/drawing/2014/main" id="{C6D0E60A-31D2-41BC-A0BB-F0C85A3FA6E8}"/>
+              </a:ext>
+            </a:extLst>
+          </p:cNvPr>
+          <p:cNvSpPr/>
+          <p:nvPr/>
+        </p:nvSpPr>
+        <p:spPr>
+          <a:xfrm>
+            <a:off x="2871724" y="2546814"/>
+            <a:ext cx="2292724" cy="336175"/>
+          </a:xfrm>
+          <a:prstGeom prst="roundRect">
+            <a:avLst/>
+          </a:prstGeom>
+          <a:solidFill>
+            <a:schemeClr val="accent2">
+              <a:lumMod val="75000"/>
+            </a:schemeClr>
+          </a:solidFill>
+          <a:ln>
+            <a:noFill/>
+          </a:ln>
+        </p:spPr>
+        <p:style>
+          <a:lnRef idx="2">
+            <a:schemeClr val="accent1">
+              <a:shade val="50000"/>
+            </a:schemeClr>
+          </a:lnRef>
+          <a:fillRef idx="1">
+            <a:schemeClr val="accent1"/>
+          </a:fillRef>
+          <a:effectRef idx="0">
+            <a:schemeClr val="accent1"/>
+          </a:effectRef>
+          <a:fontRef idx="minor">
+            <a:schemeClr val="lt1"/>
+          </a:fontRef>
+        </p:style>
+        <p:txBody>
+          <a:bodyPr rtlCol="0" anchor="ctr"/>
+          <a:lstStyle/>
+          <a:p>
+            <a:pPr algn="ctr"/>
+            <a:r>
+              <a:rPr lang="da-DK" dirty="0"/>
+              <a:t>Web API</a:t>
+            </a:r>
+          </a:p>
+        </p:txBody>
+      </p:sp>
+      <p:sp>
+        <p:nvSpPr>
+          <p:cNvPr id="14" name="Rektangel: afrundede hjørner 13">
+            <a:extLst>
+              <a:ext uri="{FF2B5EF4-FFF2-40B4-BE49-F238E27FC236}">
+                <a16:creationId xmlns:a16="http://schemas.microsoft.com/office/drawing/2014/main" id="{1B298EFC-58A4-4667-95B2-682CE3C84B14}"/>
+              </a:ext>
+            </a:extLst>
+          </p:cNvPr>
+          <p:cNvSpPr/>
+          <p:nvPr/>
+        </p:nvSpPr>
+        <p:spPr>
+          <a:xfrm>
+            <a:off x="2871724" y="1857653"/>
+            <a:ext cx="2292724" cy="336175"/>
+          </a:xfrm>
+          <a:prstGeom prst="roundRect">
+            <a:avLst/>
+          </a:prstGeom>
+          <a:solidFill>
+            <a:schemeClr val="accent2">
+              <a:lumMod val="75000"/>
+            </a:schemeClr>
+          </a:solidFill>
+          <a:ln>
+            <a:noFill/>
+          </a:ln>
+        </p:spPr>
+        <p:style>
+          <a:lnRef idx="2">
+            <a:schemeClr val="accent1">
+              <a:shade val="50000"/>
+            </a:schemeClr>
+          </a:lnRef>
+          <a:fillRef idx="1">
+            <a:schemeClr val="accent1"/>
+          </a:fillRef>
+          <a:effectRef idx="0">
+            <a:schemeClr val="accent1"/>
+          </a:effectRef>
+          <a:fontRef idx="minor">
+            <a:schemeClr val="lt1"/>
+          </a:fontRef>
+        </p:style>
+        <p:txBody>
+          <a:bodyPr rtlCol="0" anchor="ctr"/>
+          <a:lstStyle/>
+          <a:p>
+            <a:pPr algn="ctr"/>
+            <a:r>
+              <a:rPr lang="da-DK"/>
+              <a:t>HttpClientImplssim</a:t>
+            </a:r>
+            <a:endParaRPr lang="da-DK" dirty="0"/>
+          </a:p>
+        </p:txBody>
+      </p:sp>
+      <p:cxnSp>
+        <p:nvCxnSpPr>
+          <p:cNvPr id="15" name="Lige forbindelse 14">
+            <a:extLst>
+              <a:ext uri="{FF2B5EF4-FFF2-40B4-BE49-F238E27FC236}">
+                <a16:creationId xmlns:a16="http://schemas.microsoft.com/office/drawing/2014/main" id="{E5C06FA3-ED02-4053-933C-3658936FD6ED}"/>
+              </a:ext>
+            </a:extLst>
+          </p:cNvPr>
+          <p:cNvCxnSpPr>
+            <a:stCxn id="14" idx="2"/>
+            <a:endCxn id="13" idx="0"/>
+          </p:cNvCxnSpPr>
+          <p:nvPr/>
+        </p:nvCxnSpPr>
+        <p:spPr>
+          <a:xfrm>
+            <a:off x="4018086" y="2193828"/>
+            <a:ext cx="0" cy="352986"/>
+          </a:xfrm>
+          <a:prstGeom prst="line">
+            <a:avLst/>
+          </a:prstGeom>
+          <a:ln w="28575">
+            <a:solidFill>
+              <a:schemeClr val="tx1"/>
+            </a:solidFill>
+          </a:ln>
+        </p:spPr>
+        <p:style>
+          <a:lnRef idx="1">
+            <a:schemeClr val="accent1"/>
+          </a:lnRef>
+          <a:fillRef idx="0">
+            <a:schemeClr val="accent1"/>
+          </a:fillRef>
+          <a:effectRef idx="0">
+            <a:schemeClr val="accent1"/>
+          </a:effectRef>
+          <a:fontRef idx="minor">
+            <a:schemeClr val="tx1"/>
+          </a:fontRef>
+        </p:style>
+      </p:cxnSp>
+      <p:sp>
+        <p:nvSpPr>
+          <p:cNvPr id="16" name="Rektangel: afrundede hjørner 15">
+            <a:extLst>
+              <a:ext uri="{FF2B5EF4-FFF2-40B4-BE49-F238E27FC236}">
+                <a16:creationId xmlns:a16="http://schemas.microsoft.com/office/drawing/2014/main" id="{E3D62AF3-9163-4548-8506-4D150140C4EE}"/>
+              </a:ext>
+            </a:extLst>
+          </p:cNvPr>
+          <p:cNvSpPr/>
+          <p:nvPr/>
+        </p:nvSpPr>
+        <p:spPr>
+          <a:xfrm>
+            <a:off x="5639862" y="825591"/>
+            <a:ext cx="2292724" cy="705970"/>
+          </a:xfrm>
+          <a:prstGeom prst="roundRect">
+            <a:avLst/>
+          </a:prstGeom>
+          <a:solidFill>
+            <a:schemeClr val="accent6">
+              <a:lumMod val="40000"/>
+              <a:lumOff val="60000"/>
+            </a:schemeClr>
+          </a:solidFill>
+          <a:ln>
+            <a:noFill/>
+          </a:ln>
+        </p:spPr>
+        <p:style>
+          <a:lnRef idx="2">
+            <a:schemeClr val="accent1">
+              <a:shade val="50000"/>
+            </a:schemeClr>
+          </a:lnRef>
+          <a:fillRef idx="1">
+            <a:schemeClr val="accent1"/>
+          </a:fillRef>
+          <a:effectRef idx="0">
+            <a:schemeClr val="accent1"/>
+          </a:effectRef>
+          <a:fontRef idx="minor">
+            <a:schemeClr val="lt1"/>
+          </a:fontRef>
+        </p:style>
+        <p:txBody>
+          <a:bodyPr rtlCol="0" anchor="ctr"/>
+          <a:lstStyle/>
+          <a:p>
+            <a:pPr algn="ctr"/>
+            <a:r>
+              <a:rPr lang="da-DK" dirty="0"/>
+              <a:t>Pages</a:t>
+            </a:r>
+          </a:p>
+          <a:p>
+            <a:pPr algn="ctr"/>
+            <a:endParaRPr lang="da-DK" dirty="0"/>
+          </a:p>
+        </p:txBody>
+      </p:sp>
+      <p:sp>
+        <p:nvSpPr>
+          <p:cNvPr id="17" name="Rektangel: afrundede hjørner 16">
+            <a:extLst>
+              <a:ext uri="{FF2B5EF4-FFF2-40B4-BE49-F238E27FC236}">
+                <a16:creationId xmlns:a16="http://schemas.microsoft.com/office/drawing/2014/main" id="{F3F56C58-5FA4-4B7A-B325-19FEF6A9E9E9}"/>
+              </a:ext>
+            </a:extLst>
+          </p:cNvPr>
+          <p:cNvSpPr/>
+          <p:nvPr/>
+        </p:nvSpPr>
+        <p:spPr>
+          <a:xfrm>
+            <a:off x="5740715" y="1195384"/>
+            <a:ext cx="2091018" cy="262220"/>
+          </a:xfrm>
+          <a:prstGeom prst="roundRect">
+            <a:avLst/>
+          </a:prstGeom>
+          <a:solidFill>
+            <a:schemeClr val="accent6">
+              <a:lumMod val="75000"/>
+            </a:schemeClr>
+          </a:solidFill>
+          <a:ln>
+            <a:noFill/>
+          </a:ln>
+        </p:spPr>
+        <p:style>
+          <a:lnRef idx="2">
+            <a:schemeClr val="accent1">
+              <a:shade val="50000"/>
+            </a:schemeClr>
+          </a:lnRef>
+          <a:fillRef idx="1">
+            <a:schemeClr val="accent1"/>
+          </a:fillRef>
+          <a:effectRef idx="0">
+            <a:schemeClr val="accent1"/>
+          </a:effectRef>
+          <a:fontRef idx="minor">
+            <a:schemeClr val="lt1"/>
+          </a:fontRef>
+        </p:style>
+        <p:txBody>
+          <a:bodyPr rtlCol="0" anchor="ctr"/>
+          <a:lstStyle/>
+          <a:p>
+            <a:pPr algn="ctr"/>
+            <a:r>
+              <a:rPr lang="da-DK" dirty="0"/>
+              <a:t>Code </a:t>
+            </a:r>
+            <a:r>
+              <a:rPr lang="da-DK" dirty="0" err="1"/>
+              <a:t>blocks</a:t>
+            </a:r>
+            <a:endParaRPr lang="da-DK" dirty="0"/>
+          </a:p>
+        </p:txBody>
+      </p:sp>
+      <p:sp>
+        <p:nvSpPr>
+          <p:cNvPr id="18" name="Rektangel: afrundede hjørner 17">
+            <a:extLst>
+              <a:ext uri="{FF2B5EF4-FFF2-40B4-BE49-F238E27FC236}">
+                <a16:creationId xmlns:a16="http://schemas.microsoft.com/office/drawing/2014/main" id="{C5A9BFAF-7927-4817-8909-A42A723C5B30}"/>
+              </a:ext>
+            </a:extLst>
+          </p:cNvPr>
+          <p:cNvSpPr/>
+          <p:nvPr/>
+        </p:nvSpPr>
+        <p:spPr>
+          <a:xfrm>
+            <a:off x="5639862" y="1571905"/>
+            <a:ext cx="2292724" cy="188256"/>
+          </a:xfrm>
+          <a:prstGeom prst="roundRect">
+            <a:avLst/>
+          </a:prstGeom>
+          <a:solidFill>
+            <a:schemeClr val="bg1">
+              <a:lumMod val="85000"/>
+            </a:schemeClr>
+          </a:solidFill>
+          <a:ln>
+            <a:noFill/>
+          </a:ln>
+        </p:spPr>
+        <p:style>
+          <a:lnRef idx="2">
+            <a:schemeClr val="accent1">
+              <a:shade val="50000"/>
+            </a:schemeClr>
+          </a:lnRef>
+          <a:fillRef idx="1">
+            <a:schemeClr val="accent1"/>
+          </a:fillRef>
+          <a:effectRef idx="0">
+            <a:schemeClr val="accent1"/>
+          </a:effectRef>
+          <a:fontRef idx="minor">
+            <a:schemeClr val="lt1"/>
+          </a:fontRef>
+        </p:style>
+        <p:txBody>
+          <a:bodyPr rtlCol="0" anchor="ctr"/>
+          <a:lstStyle/>
+          <a:p>
+            <a:pPr algn="ctr"/>
+            <a:r>
+              <a:rPr lang="da-DK" dirty="0">
+                <a:solidFill>
+                  <a:schemeClr val="tx1"/>
+                </a:solidFill>
+              </a:rPr>
+              <a:t>&lt;&lt;</a:t>
+            </a:r>
+            <a:r>
+              <a:rPr lang="da-DK" dirty="0" err="1">
+                <a:solidFill>
+                  <a:schemeClr val="tx1"/>
+                </a:solidFill>
+              </a:rPr>
+              <a:t>IService</a:t>
+            </a:r>
+            <a:r>
+              <a:rPr lang="da-DK" dirty="0">
+                <a:solidFill>
+                  <a:schemeClr val="tx1"/>
+                </a:solidFill>
+              </a:rPr>
+              <a:t>&gt;&gt;</a:t>
+            </a:r>
+          </a:p>
+        </p:txBody>
+      </p:sp>
+      <p:sp>
+        <p:nvSpPr>
+          <p:cNvPr id="19" name="Rektangel: afrundede hjørner 18">
+            <a:extLst>
+              <a:ext uri="{FF2B5EF4-FFF2-40B4-BE49-F238E27FC236}">
+                <a16:creationId xmlns:a16="http://schemas.microsoft.com/office/drawing/2014/main" id="{00813D34-C719-4C13-A877-CE6A8FCB881E}"/>
+              </a:ext>
+            </a:extLst>
+          </p:cNvPr>
+          <p:cNvSpPr/>
+          <p:nvPr/>
+        </p:nvSpPr>
+        <p:spPr>
+          <a:xfrm>
+            <a:off x="5639862" y="3283038"/>
+            <a:ext cx="2292724" cy="336175"/>
+          </a:xfrm>
+          <a:prstGeom prst="roundRect">
+            <a:avLst/>
+          </a:prstGeom>
+          <a:solidFill>
+            <a:schemeClr val="accent5">
+              <a:lumMod val="40000"/>
+              <a:lumOff val="60000"/>
+            </a:schemeClr>
+          </a:solidFill>
+          <a:ln>
+            <a:noFill/>
+          </a:ln>
+        </p:spPr>
+        <p:style>
+          <a:lnRef idx="2">
+            <a:schemeClr val="accent1">
+              <a:shade val="50000"/>
+            </a:schemeClr>
+          </a:lnRef>
+          <a:fillRef idx="1">
+            <a:schemeClr val="accent1"/>
+          </a:fillRef>
+          <a:effectRef idx="0">
+            <a:schemeClr val="accent1"/>
+          </a:effectRef>
+          <a:fontRef idx="minor">
+            <a:schemeClr val="lt1"/>
+          </a:fontRef>
+        </p:style>
+        <p:txBody>
+          <a:bodyPr rtlCol="0" anchor="ctr"/>
+          <a:lstStyle/>
+          <a:p>
+            <a:pPr algn="ctr"/>
+            <a:r>
+              <a:rPr lang="da-DK" dirty="0"/>
+              <a:t>Services (</a:t>
+            </a:r>
+            <a:r>
+              <a:rPr lang="da-DK" dirty="0" err="1"/>
+              <a:t>logic</a:t>
+            </a:r>
+            <a:r>
+              <a:rPr lang="da-DK" dirty="0"/>
+              <a:t>)</a:t>
+            </a:r>
+          </a:p>
+        </p:txBody>
+      </p:sp>
+      <p:sp>
+        <p:nvSpPr>
+          <p:cNvPr id="20" name="Rektangel: afrundede hjørner 19">
+            <a:extLst>
+              <a:ext uri="{FF2B5EF4-FFF2-40B4-BE49-F238E27FC236}">
+                <a16:creationId xmlns:a16="http://schemas.microsoft.com/office/drawing/2014/main" id="{0044BBD9-393D-4D18-BF43-E259AF4E740F}"/>
+              </a:ext>
+            </a:extLst>
+          </p:cNvPr>
+          <p:cNvSpPr/>
+          <p:nvPr/>
+        </p:nvSpPr>
+        <p:spPr>
+          <a:xfrm>
+            <a:off x="5639862" y="3686449"/>
+            <a:ext cx="2292724" cy="188256"/>
+          </a:xfrm>
+          <a:prstGeom prst="roundRect">
+            <a:avLst/>
+          </a:prstGeom>
+          <a:solidFill>
+            <a:schemeClr val="bg1">
+              <a:lumMod val="85000"/>
+            </a:schemeClr>
+          </a:solidFill>
+          <a:ln>
+            <a:noFill/>
+          </a:ln>
+        </p:spPr>
+        <p:style>
+          <a:lnRef idx="2">
+            <a:schemeClr val="accent1">
+              <a:shade val="50000"/>
+            </a:schemeClr>
+          </a:lnRef>
+          <a:fillRef idx="1">
+            <a:schemeClr val="accent1"/>
+          </a:fillRef>
+          <a:effectRef idx="0">
+            <a:schemeClr val="accent1"/>
+          </a:effectRef>
+          <a:fontRef idx="minor">
+            <a:schemeClr val="lt1"/>
+          </a:fontRef>
+        </p:style>
+        <p:txBody>
+          <a:bodyPr rtlCol="0" anchor="ctr"/>
+          <a:lstStyle/>
+          <a:p>
+            <a:pPr algn="ctr"/>
+            <a:r>
+              <a:rPr lang="da-DK" dirty="0">
+                <a:solidFill>
+                  <a:schemeClr val="tx1"/>
+                </a:solidFill>
+              </a:rPr>
+              <a:t>&lt;&lt;IDAO&gt;&gt;</a:t>
+            </a:r>
+          </a:p>
+        </p:txBody>
+      </p:sp>
+      <p:sp>
+        <p:nvSpPr>
+          <p:cNvPr id="21" name="Rektangel: afrundede hjørner 20">
+            <a:extLst>
+              <a:ext uri="{FF2B5EF4-FFF2-40B4-BE49-F238E27FC236}">
+                <a16:creationId xmlns:a16="http://schemas.microsoft.com/office/drawing/2014/main" id="{E16DD91D-4B82-4DD7-9CD9-6C54D5F7F130}"/>
+              </a:ext>
+            </a:extLst>
+          </p:cNvPr>
+          <p:cNvSpPr/>
+          <p:nvPr/>
+        </p:nvSpPr>
+        <p:spPr>
+          <a:xfrm>
+            <a:off x="5639862" y="3941941"/>
+            <a:ext cx="2292724" cy="336175"/>
+          </a:xfrm>
+          <a:prstGeom prst="roundRect">
+            <a:avLst/>
+          </a:prstGeom>
+          <a:solidFill>
+            <a:schemeClr val="accent2">
+              <a:lumMod val="60000"/>
+              <a:lumOff val="40000"/>
+            </a:schemeClr>
+          </a:solidFill>
+          <a:ln>
+            <a:noFill/>
+          </a:ln>
+        </p:spPr>
+        <p:style>
+          <a:lnRef idx="2">
+            <a:schemeClr val="accent1">
+              <a:shade val="50000"/>
+            </a:schemeClr>
+          </a:lnRef>
+          <a:fillRef idx="1">
+            <a:schemeClr val="accent1"/>
+          </a:fillRef>
+          <a:effectRef idx="0">
+            <a:schemeClr val="accent1"/>
+          </a:effectRef>
+          <a:fontRef idx="minor">
+            <a:schemeClr val="lt1"/>
+          </a:fontRef>
+        </p:style>
+        <p:txBody>
+          <a:bodyPr rtlCol="0" anchor="ctr"/>
+          <a:lstStyle/>
+          <a:p>
+            <a:pPr algn="ctr"/>
+            <a:r>
+              <a:rPr lang="da-DK" dirty="0" err="1"/>
+              <a:t>DAOs</a:t>
+            </a:r>
+            <a:endParaRPr lang="da-DK" dirty="0"/>
+          </a:p>
+        </p:txBody>
+      </p:sp>
+      <p:sp>
+        <p:nvSpPr>
+          <p:cNvPr id="22" name="Rektangel: afrundede hjørner 21">
+            <a:extLst>
+              <a:ext uri="{FF2B5EF4-FFF2-40B4-BE49-F238E27FC236}">
+                <a16:creationId xmlns:a16="http://schemas.microsoft.com/office/drawing/2014/main" id="{456E6CC0-F782-409F-936B-E2EA03694965}"/>
+              </a:ext>
+            </a:extLst>
+          </p:cNvPr>
+          <p:cNvSpPr/>
+          <p:nvPr/>
+        </p:nvSpPr>
+        <p:spPr>
+          <a:xfrm>
+            <a:off x="6090339" y="4405866"/>
+            <a:ext cx="1391770" cy="336175"/>
+          </a:xfrm>
+          <a:prstGeom prst="roundRect">
+            <a:avLst/>
+          </a:prstGeom>
+          <a:solidFill>
+            <a:srgbClr val="F1BBD6"/>
+          </a:solidFill>
+          <a:ln>
+            <a:noFill/>
+          </a:ln>
+        </p:spPr>
+        <p:style>
+          <a:lnRef idx="2">
+            <a:schemeClr val="accent1">
+              <a:shade val="50000"/>
+            </a:schemeClr>
+          </a:lnRef>
+          <a:fillRef idx="1">
+            <a:schemeClr val="accent1"/>
+          </a:fillRef>
+          <a:effectRef idx="0">
+            <a:schemeClr val="accent1"/>
+          </a:effectRef>
+          <a:fontRef idx="minor">
+            <a:schemeClr val="lt1"/>
+          </a:fontRef>
+        </p:style>
+        <p:txBody>
+          <a:bodyPr rtlCol="0" anchor="ctr"/>
+          <a:lstStyle/>
+          <a:p>
+            <a:pPr algn="ctr"/>
+            <a:r>
+              <a:rPr lang="da-DK" dirty="0" err="1"/>
+              <a:t>DbContext</a:t>
+            </a:r>
+            <a:endParaRPr lang="da-DK" dirty="0"/>
+          </a:p>
+        </p:txBody>
+      </p:sp>
+      <p:sp>
+        <p:nvSpPr>
+          <p:cNvPr id="24" name="Rektangel: afrundede hjørner 23">
+            <a:extLst>
+              <a:ext uri="{FF2B5EF4-FFF2-40B4-BE49-F238E27FC236}">
+                <a16:creationId xmlns:a16="http://schemas.microsoft.com/office/drawing/2014/main" id="{E0A27CF1-CC23-4C69-BB9E-7E19F5494571}"/>
+              </a:ext>
+            </a:extLst>
+          </p:cNvPr>
+          <p:cNvSpPr/>
+          <p:nvPr/>
+        </p:nvSpPr>
+        <p:spPr>
+          <a:xfrm>
+            <a:off x="5639862" y="2980481"/>
+            <a:ext cx="2292724" cy="188256"/>
+          </a:xfrm>
+          <a:prstGeom prst="roundRect">
+            <a:avLst/>
+          </a:prstGeom>
+          <a:solidFill>
+            <a:schemeClr val="bg1">
+              <a:lumMod val="85000"/>
+            </a:schemeClr>
+          </a:solidFill>
+          <a:ln>
+            <a:noFill/>
+          </a:ln>
+        </p:spPr>
+        <p:style>
+          <a:lnRef idx="2">
+            <a:schemeClr val="accent1">
+              <a:shade val="50000"/>
+            </a:schemeClr>
+          </a:lnRef>
+          <a:fillRef idx="1">
+            <a:schemeClr val="accent1"/>
+          </a:fillRef>
+          <a:effectRef idx="0">
+            <a:schemeClr val="accent1"/>
+          </a:effectRef>
+          <a:fontRef idx="minor">
+            <a:schemeClr val="lt1"/>
+          </a:fontRef>
+        </p:style>
+        <p:txBody>
+          <a:bodyPr rtlCol="0" anchor="ctr"/>
+          <a:lstStyle/>
+          <a:p>
+            <a:pPr algn="ctr"/>
+            <a:r>
+              <a:rPr lang="da-DK" dirty="0">
+                <a:solidFill>
+                  <a:schemeClr val="tx1"/>
+                </a:solidFill>
+              </a:rPr>
+              <a:t>&lt;&lt;</a:t>
+            </a:r>
+            <a:r>
+              <a:rPr lang="da-DK" dirty="0" err="1">
+                <a:solidFill>
+                  <a:schemeClr val="tx1"/>
+                </a:solidFill>
+              </a:rPr>
+              <a:t>IService</a:t>
+            </a:r>
+            <a:r>
+              <a:rPr lang="da-DK" dirty="0">
+                <a:solidFill>
+                  <a:schemeClr val="tx1"/>
+                </a:solidFill>
+              </a:rPr>
+              <a:t>&gt;&gt;</a:t>
+            </a:r>
+          </a:p>
+        </p:txBody>
+      </p:sp>
+      <p:sp>
+        <p:nvSpPr>
+          <p:cNvPr id="25" name="Rektangel: afrundede hjørner 24">
+            <a:extLst>
+              <a:ext uri="{FF2B5EF4-FFF2-40B4-BE49-F238E27FC236}">
+                <a16:creationId xmlns:a16="http://schemas.microsoft.com/office/drawing/2014/main" id="{783E106E-A851-4775-BDBB-17B55F5F0E4D}"/>
+              </a:ext>
+            </a:extLst>
+          </p:cNvPr>
+          <p:cNvSpPr/>
+          <p:nvPr/>
+        </p:nvSpPr>
+        <p:spPr>
+          <a:xfrm>
+            <a:off x="5639862" y="2546814"/>
+            <a:ext cx="2292724" cy="336175"/>
+          </a:xfrm>
+          <a:prstGeom prst="roundRect">
+            <a:avLst/>
+          </a:prstGeom>
+          <a:solidFill>
+            <a:schemeClr val="accent2">
+              <a:lumMod val="75000"/>
+            </a:schemeClr>
+          </a:solidFill>
+          <a:ln>
+            <a:noFill/>
+          </a:ln>
+        </p:spPr>
+        <p:style>
+          <a:lnRef idx="2">
+            <a:schemeClr val="accent1">
+              <a:shade val="50000"/>
+            </a:schemeClr>
+          </a:lnRef>
+          <a:fillRef idx="1">
+            <a:schemeClr val="accent1"/>
+          </a:fillRef>
+          <a:effectRef idx="0">
+            <a:schemeClr val="accent1"/>
+          </a:effectRef>
+          <a:fontRef idx="minor">
+            <a:schemeClr val="lt1"/>
+          </a:fontRef>
+        </p:style>
+        <p:txBody>
+          <a:bodyPr rtlCol="0" anchor="ctr"/>
+          <a:lstStyle/>
+          <a:p>
+            <a:pPr algn="ctr"/>
+            <a:r>
+              <a:rPr lang="da-DK" dirty="0"/>
+              <a:t>Web API</a:t>
+            </a:r>
+          </a:p>
+        </p:txBody>
+      </p:sp>
+      <p:sp>
+        <p:nvSpPr>
+          <p:cNvPr id="26" name="Rektangel: afrundede hjørner 25">
+            <a:extLst>
+              <a:ext uri="{FF2B5EF4-FFF2-40B4-BE49-F238E27FC236}">
+                <a16:creationId xmlns:a16="http://schemas.microsoft.com/office/drawing/2014/main" id="{46D9B741-7E45-4646-9EC5-7FA4124492B0}"/>
+              </a:ext>
+            </a:extLst>
+          </p:cNvPr>
+          <p:cNvSpPr/>
+          <p:nvPr/>
+        </p:nvSpPr>
+        <p:spPr>
+          <a:xfrm>
+            <a:off x="5639862" y="1857653"/>
+            <a:ext cx="2292724" cy="336175"/>
+          </a:xfrm>
+          <a:prstGeom prst="roundRect">
+            <a:avLst/>
+          </a:prstGeom>
+          <a:solidFill>
+            <a:schemeClr val="accent2">
+              <a:lumMod val="75000"/>
+            </a:schemeClr>
+          </a:solidFill>
+          <a:ln>
+            <a:noFill/>
+          </a:ln>
+        </p:spPr>
+        <p:style>
+          <a:lnRef idx="2">
+            <a:schemeClr val="accent1">
+              <a:shade val="50000"/>
+            </a:schemeClr>
+          </a:lnRef>
+          <a:fillRef idx="1">
+            <a:schemeClr val="accent1"/>
+          </a:fillRef>
+          <a:effectRef idx="0">
+            <a:schemeClr val="accent1"/>
+          </a:effectRef>
+          <a:fontRef idx="minor">
+            <a:schemeClr val="lt1"/>
+          </a:fontRef>
+        </p:style>
+        <p:txBody>
+          <a:bodyPr rtlCol="0" anchor="ctr"/>
+          <a:lstStyle/>
+          <a:p>
+            <a:pPr algn="ctr"/>
+            <a:r>
+              <a:rPr lang="da-DK"/>
+              <a:t>HttpClientImplssim</a:t>
+            </a:r>
+            <a:endParaRPr lang="da-DK" dirty="0"/>
+          </a:p>
+        </p:txBody>
+      </p:sp>
+      <p:cxnSp>
+        <p:nvCxnSpPr>
+          <p:cNvPr id="27" name="Lige forbindelse 26">
+            <a:extLst>
+              <a:ext uri="{FF2B5EF4-FFF2-40B4-BE49-F238E27FC236}">
+                <a16:creationId xmlns:a16="http://schemas.microsoft.com/office/drawing/2014/main" id="{25B68669-018D-4D96-93FD-FA53EA8309FD}"/>
+              </a:ext>
+            </a:extLst>
+          </p:cNvPr>
+          <p:cNvCxnSpPr>
+            <a:stCxn id="26" idx="2"/>
+            <a:endCxn id="25" idx="0"/>
+          </p:cNvCxnSpPr>
+          <p:nvPr/>
+        </p:nvCxnSpPr>
+        <p:spPr>
+          <a:xfrm>
+            <a:off x="6786224" y="2193828"/>
+            <a:ext cx="0" cy="352986"/>
+          </a:xfrm>
+          <a:prstGeom prst="line">
+            <a:avLst/>
+          </a:prstGeom>
+          <a:ln w="28575">
+            <a:solidFill>
+              <a:schemeClr val="tx1"/>
+            </a:solidFill>
+          </a:ln>
+        </p:spPr>
+        <p:style>
+          <a:lnRef idx="1">
+            <a:schemeClr val="accent1"/>
+          </a:lnRef>
+          <a:fillRef idx="0">
+            <a:schemeClr val="accent1"/>
+          </a:fillRef>
+          <a:effectRef idx="0">
+            <a:schemeClr val="accent1"/>
+          </a:effectRef>
+          <a:fontRef idx="minor">
+            <a:schemeClr val="tx1"/>
+          </a:fontRef>
+        </p:style>
+      </p:cxnSp>
+      <p:pic>
+        <p:nvPicPr>
+          <p:cNvPr id="1026" name="Picture 2" descr="Database Free Icon - Icon-Icons.com">
+            <a:extLst>
+              <a:ext uri="{FF2B5EF4-FFF2-40B4-BE49-F238E27FC236}">
+                <a16:creationId xmlns:a16="http://schemas.microsoft.com/office/drawing/2014/main" id="{BC7D1044-D46C-49B6-987E-183586893B1D}"/>
+              </a:ext>
+            </a:extLst>
+          </p:cNvPr>
+          <p:cNvPicPr>
+            <a:picLocks noChangeAspect="1" noChangeArrowheads="1"/>
+          </p:cNvPicPr>
+          <p:nvPr/>
+        </p:nvPicPr>
+        <p:blipFill>
+          <a:blip r:embed="rId3">
+            <a:clrChange>
+              <a:clrFrom>
+                <a:srgbClr val="FFFFFF"/>
+              </a:clrFrom>
+              <a:clrTo>
+                <a:srgbClr val="FFFFFF">
+                  <a:alpha val="0"/>
+                </a:srgbClr>
+              </a:clrTo>
+            </a:clrChange>
+            <a:extLst>
+              <a:ext uri="{28A0092B-C50C-407E-A947-70E740481C1C}">
+                <a14:useLocalDpi xmlns:a14="http://schemas.microsoft.com/office/drawing/2010/main" val="0"/>
+              </a:ext>
+            </a:extLst>
+          </a:blip>
+          <a:srcRect/>
+          <a:stretch>
+            <a:fillRect/>
+          </a:stretch>
+        </p:blipFill>
+        <p:spPr bwMode="auto">
+          <a:xfrm>
+            <a:off x="6346603" y="4869791"/>
+            <a:ext cx="879242" cy="879242"/>
+          </a:xfrm>
+          <a:prstGeom prst="rect">
+            <a:avLst/>
+          </a:prstGeom>
+          <a:noFill/>
+          <a:extLst>
+            <a:ext uri="{909E8E84-426E-40DD-AFC4-6F175D3DCCD1}">
+              <a14:hiddenFill xmlns:a14="http://schemas.microsoft.com/office/drawing/2010/main">
+                <a:solidFill>
+                  <a:srgbClr val="FFFFFF"/>
+                </a:solidFill>
+              </a14:hiddenFill>
+            </a:ext>
+          </a:extLst>
+        </p:spPr>
+      </p:pic>
+    </p:spTree>
+    <p:extLst>
+      <p:ext uri="{BB962C8B-B14F-4D97-AF65-F5344CB8AC3E}">
+        <p14:creationId xmlns:p14="http://schemas.microsoft.com/office/powerpoint/2010/main" val="798049679"/>
+      </p:ext>
+    </p:extLst>
+  </p:cSld>
+  <p:clrMapOvr>
+    <a:masterClrMapping/>
+  </p:clrMapOvr>
+</p:sld>
+</file>
+
 <file path=ppt/theme/theme1.xml><?xml version="1.0" encoding="utf-8"?>
 <a:theme xmlns:a="http://schemas.openxmlformats.org/drawingml/2006/main" name="Office Theme">
   <a:themeElements>

</xml_diff>